<commit_message>
August 17th second commit
</commit_message>
<xml_diff>
--- a/Sales_More_ppt2.2.pptx
+++ b/Sales_More_ppt2.2.pptx
@@ -997,7 +997,7 @@
           <p:cNvPr id="14" name="텍스트 개체 틀 2">
             <a:extLst>
               <a:ext uri="{FF2B5EF4-FFF2-40B4-BE49-F238E27FC236}">
-                <a16:creationId xmlns="" xmlns:a16="http://schemas.microsoft.com/office/drawing/2014/main" id="{D9F618CC-D8E6-4C54-B0ED-AEC47F586215}"/>
+                <a16:creationId xmlns:a16="http://schemas.microsoft.com/office/drawing/2014/main" xmlns="" id="{D9F618CC-D8E6-4C54-B0ED-AEC47F586215}"/>
               </a:ext>
             </a:extLst>
           </p:cNvPr>
@@ -1398,14 +1398,14 @@
                 <a:gridCol w="1997689">
                   <a:extLst>
                     <a:ext uri="{9D8B030D-6E8A-4147-A177-3AD203B41FA5}">
-                      <a16:colId xmlns="" xmlns:a16="http://schemas.microsoft.com/office/drawing/2014/main" val="20000"/>
+                      <a16:colId xmlns:a16="http://schemas.microsoft.com/office/drawing/2014/main" xmlns="" val="20000"/>
                     </a:ext>
                   </a:extLst>
                 </a:gridCol>
                 <a:gridCol w="1997689">
                   <a:extLst>
                     <a:ext uri="{9D8B030D-6E8A-4147-A177-3AD203B41FA5}">
-                      <a16:colId xmlns="" xmlns:a16="http://schemas.microsoft.com/office/drawing/2014/main" val="20001"/>
+                      <a16:colId xmlns:a16="http://schemas.microsoft.com/office/drawing/2014/main" xmlns="" val="20001"/>
                     </a:ext>
                   </a:extLst>
                 </a:gridCol>
@@ -1671,7 +1671,7 @@
                 </a:tc>
                 <a:extLst>
                   <a:ext uri="{0D108BD9-81ED-4DB2-BD59-A6C34878D82A}">
-                    <a16:rowId xmlns="" xmlns:a16="http://schemas.microsoft.com/office/drawing/2014/main" val="10000"/>
+                    <a16:rowId xmlns:a16="http://schemas.microsoft.com/office/drawing/2014/main" xmlns="" val="10000"/>
                   </a:ext>
                 </a:extLst>
               </a:tr>
@@ -1879,7 +1879,7 @@
                 </a:tc>
                 <a:extLst>
                   <a:ext uri="{0D108BD9-81ED-4DB2-BD59-A6C34878D82A}">
-                    <a16:rowId xmlns="" xmlns:a16="http://schemas.microsoft.com/office/drawing/2014/main" val="10001"/>
+                    <a16:rowId xmlns:a16="http://schemas.microsoft.com/office/drawing/2014/main" xmlns="" val="10001"/>
                   </a:ext>
                 </a:extLst>
               </a:tr>
@@ -2556,14 +2556,14 @@
                 <a:gridCol w="1013745">
                   <a:extLst>
                     <a:ext uri="{9D8B030D-6E8A-4147-A177-3AD203B41FA5}">
-                      <a16:colId xmlns="" xmlns:a16="http://schemas.microsoft.com/office/drawing/2014/main" val="20000"/>
+                      <a16:colId xmlns:a16="http://schemas.microsoft.com/office/drawing/2014/main" xmlns="" val="20000"/>
                     </a:ext>
                   </a:extLst>
                 </a:gridCol>
                 <a:gridCol w="8486992">
                   <a:extLst>
                     <a:ext uri="{9D8B030D-6E8A-4147-A177-3AD203B41FA5}">
-                      <a16:colId xmlns="" xmlns:a16="http://schemas.microsoft.com/office/drawing/2014/main" val="20001"/>
+                      <a16:colId xmlns:a16="http://schemas.microsoft.com/office/drawing/2014/main" xmlns="" val="20001"/>
                     </a:ext>
                   </a:extLst>
                 </a:gridCol>
@@ -2689,7 +2689,7 @@
                 </a:tc>
                 <a:extLst>
                   <a:ext uri="{0D108BD9-81ED-4DB2-BD59-A6C34878D82A}">
-                    <a16:rowId xmlns="" xmlns:a16="http://schemas.microsoft.com/office/drawing/2014/main" val="10000"/>
+                    <a16:rowId xmlns:a16="http://schemas.microsoft.com/office/drawing/2014/main" xmlns="" val="10000"/>
                   </a:ext>
                 </a:extLst>
               </a:tr>
@@ -3799,14 +3799,14 @@
                 <a:gridCol w="1061721">
                   <a:extLst>
                     <a:ext uri="{9D8B030D-6E8A-4147-A177-3AD203B41FA5}">
-                      <a16:colId xmlns="" xmlns:a16="http://schemas.microsoft.com/office/drawing/2014/main" val="20000"/>
+                      <a16:colId xmlns:a16="http://schemas.microsoft.com/office/drawing/2014/main" xmlns="" val="20000"/>
                     </a:ext>
                   </a:extLst>
                 </a:gridCol>
                 <a:gridCol w="1061721">
                   <a:extLst>
                     <a:ext uri="{9D8B030D-6E8A-4147-A177-3AD203B41FA5}">
-                      <a16:colId xmlns="" xmlns:a16="http://schemas.microsoft.com/office/drawing/2014/main" val="20001"/>
+                      <a16:colId xmlns:a16="http://schemas.microsoft.com/office/drawing/2014/main" xmlns="" val="20001"/>
                     </a:ext>
                   </a:extLst>
                 </a:gridCol>
@@ -4072,7 +4072,7 @@
                 </a:tc>
                 <a:extLst>
                   <a:ext uri="{0D108BD9-81ED-4DB2-BD59-A6C34878D82A}">
-                    <a16:rowId xmlns="" xmlns:a16="http://schemas.microsoft.com/office/drawing/2014/main" val="10000"/>
+                    <a16:rowId xmlns:a16="http://schemas.microsoft.com/office/drawing/2014/main" xmlns="" val="10000"/>
                   </a:ext>
                 </a:extLst>
               </a:tr>
@@ -4280,7 +4280,7 @@
                 </a:tc>
                 <a:extLst>
                   <a:ext uri="{0D108BD9-81ED-4DB2-BD59-A6C34878D82A}">
-                    <a16:rowId xmlns="" xmlns:a16="http://schemas.microsoft.com/office/drawing/2014/main" val="10001"/>
+                    <a16:rowId xmlns:a16="http://schemas.microsoft.com/office/drawing/2014/main" xmlns="" val="10001"/>
                   </a:ext>
                 </a:extLst>
               </a:tr>
@@ -4456,7 +4456,7 @@
           <p:cNvPr id="6" name="표 6">
             <a:extLst>
               <a:ext uri="{FF2B5EF4-FFF2-40B4-BE49-F238E27FC236}">
-                <a16:creationId xmlns="" xmlns:a16="http://schemas.microsoft.com/office/drawing/2014/main" id="{FABD37FA-5048-4585-BC20-8611CCD03331}"/>
+                <a16:creationId xmlns:a16="http://schemas.microsoft.com/office/drawing/2014/main" xmlns="" id="{FABD37FA-5048-4585-BC20-8611CCD03331}"/>
               </a:ext>
             </a:extLst>
           </p:cNvPr>
@@ -4485,14 +4485,14 @@
                 <a:gridCol w="1059088">
                   <a:extLst>
                     <a:ext uri="{9D8B030D-6E8A-4147-A177-3AD203B41FA5}">
-                      <a16:colId xmlns="" xmlns:a16="http://schemas.microsoft.com/office/drawing/2014/main" val="3453536458"/>
+                      <a16:colId xmlns:a16="http://schemas.microsoft.com/office/drawing/2014/main" xmlns="" val="3453536458"/>
                     </a:ext>
                   </a:extLst>
                 </a:gridCol>
                 <a:gridCol w="1059088">
                   <a:extLst>
                     <a:ext uri="{9D8B030D-6E8A-4147-A177-3AD203B41FA5}">
-                      <a16:colId xmlns="" xmlns:a16="http://schemas.microsoft.com/office/drawing/2014/main" val="3795268207"/>
+                      <a16:colId xmlns:a16="http://schemas.microsoft.com/office/drawing/2014/main" xmlns="" val="3795268207"/>
                     </a:ext>
                   </a:extLst>
                 </a:gridCol>
@@ -4590,7 +4590,7 @@
                 </a:tc>
                 <a:extLst>
                   <a:ext uri="{0D108BD9-81ED-4DB2-BD59-A6C34878D82A}">
-                    <a16:rowId xmlns="" xmlns:a16="http://schemas.microsoft.com/office/drawing/2014/main" val="3283157434"/>
+                    <a16:rowId xmlns:a16="http://schemas.microsoft.com/office/drawing/2014/main" xmlns="" val="3283157434"/>
                   </a:ext>
                 </a:extLst>
               </a:tr>
@@ -4687,7 +4687,7 @@
                 </a:tc>
                 <a:extLst>
                   <a:ext uri="{0D108BD9-81ED-4DB2-BD59-A6C34878D82A}">
-                    <a16:rowId xmlns="" xmlns:a16="http://schemas.microsoft.com/office/drawing/2014/main" val="2011600100"/>
+                    <a16:rowId xmlns:a16="http://schemas.microsoft.com/office/drawing/2014/main" xmlns="" val="2011600100"/>
                   </a:ext>
                 </a:extLst>
               </a:tr>
@@ -4784,7 +4784,7 @@
                 </a:tc>
                 <a:extLst>
                   <a:ext uri="{0D108BD9-81ED-4DB2-BD59-A6C34878D82A}">
-                    <a16:rowId xmlns="" xmlns:a16="http://schemas.microsoft.com/office/drawing/2014/main" val="4144869136"/>
+                    <a16:rowId xmlns:a16="http://schemas.microsoft.com/office/drawing/2014/main" xmlns="" val="4144869136"/>
                   </a:ext>
                 </a:extLst>
               </a:tr>
@@ -4881,7 +4881,7 @@
                 </a:tc>
                 <a:extLst>
                   <a:ext uri="{0D108BD9-81ED-4DB2-BD59-A6C34878D82A}">
-                    <a16:rowId xmlns="" xmlns:a16="http://schemas.microsoft.com/office/drawing/2014/main" val="2368941102"/>
+                    <a16:rowId xmlns:a16="http://schemas.microsoft.com/office/drawing/2014/main" xmlns="" val="2368941102"/>
                   </a:ext>
                 </a:extLst>
               </a:tr>
@@ -5853,7 +5853,7 @@
           <p:nvPr userDrawn="1">
             <p:extLst>
               <p:ext uri="{D42A27DB-BD31-4B8C-83A1-F6EECF244321}">
-                <p14:modId xmlns:p14="http://schemas.microsoft.com/office/powerpoint/2010/main" val="1268468250"/>
+                <p14:modId xmlns:p14="http://schemas.microsoft.com/office/powerpoint/2010/main" val="2466762346"/>
               </p:ext>
             </p:extLst>
           </p:nvPr>
@@ -5872,35 +5872,35 @@
                 <a:gridCol w="880644">
                   <a:extLst>
                     <a:ext uri="{9D8B030D-6E8A-4147-A177-3AD203B41FA5}">
-                      <a16:colId xmlns="" xmlns:a16="http://schemas.microsoft.com/office/drawing/2014/main" val="20000"/>
+                      <a16:colId xmlns:a16="http://schemas.microsoft.com/office/drawing/2014/main" xmlns="" val="20000"/>
                     </a:ext>
                   </a:extLst>
                 </a:gridCol>
                 <a:gridCol w="880644">
                   <a:extLst>
                     <a:ext uri="{9D8B030D-6E8A-4147-A177-3AD203B41FA5}">
-                      <a16:colId xmlns="" xmlns:a16="http://schemas.microsoft.com/office/drawing/2014/main" val="2960935981"/>
+                      <a16:colId xmlns:a16="http://schemas.microsoft.com/office/drawing/2014/main" xmlns="" val="2960935981"/>
                     </a:ext>
                   </a:extLst>
                 </a:gridCol>
                 <a:gridCol w="880644">
                   <a:extLst>
                     <a:ext uri="{9D8B030D-6E8A-4147-A177-3AD203B41FA5}">
-                      <a16:colId xmlns="" xmlns:a16="http://schemas.microsoft.com/office/drawing/2014/main" val="20001"/>
+                      <a16:colId xmlns:a16="http://schemas.microsoft.com/office/drawing/2014/main" xmlns="" val="20001"/>
                     </a:ext>
                   </a:extLst>
                 </a:gridCol>
                 <a:gridCol w="880644">
                   <a:extLst>
                     <a:ext uri="{9D8B030D-6E8A-4147-A177-3AD203B41FA5}">
-                      <a16:colId xmlns="" xmlns:a16="http://schemas.microsoft.com/office/drawing/2014/main" val="20002"/>
+                      <a16:colId xmlns:a16="http://schemas.microsoft.com/office/drawing/2014/main" xmlns="" val="20002"/>
                     </a:ext>
                   </a:extLst>
                 </a:gridCol>
                 <a:gridCol w="880644">
                   <a:extLst>
                     <a:ext uri="{9D8B030D-6E8A-4147-A177-3AD203B41FA5}">
-                      <a16:colId xmlns="" xmlns:a16="http://schemas.microsoft.com/office/drawing/2014/main" val="20003"/>
+                      <a16:colId xmlns:a16="http://schemas.microsoft.com/office/drawing/2014/main" xmlns="" val="20003"/>
                     </a:ext>
                   </a:extLst>
                 </a:gridCol>
@@ -6060,7 +6060,7 @@
                           <a:latin typeface="+mn-ea"/>
                           <a:ea typeface="+mn-ea"/>
                         </a:rPr>
-                        <a:t>80~89%</a:t>
+                        <a:t>90~99%</a:t>
                       </a:r>
                       <a:endParaRPr lang="ko-KR" altLang="en-US" sz="1200" b="0" dirty="0">
                         <a:solidFill>
@@ -6130,7 +6130,7 @@
                           <a:latin typeface="+mn-ea"/>
                           <a:ea typeface="+mn-ea"/>
                         </a:rPr>
-                        <a:t>90%~</a:t>
+                        <a:t>100%~</a:t>
                       </a:r>
                       <a:endParaRPr lang="ko-KR" altLang="en-US" sz="1200" b="0" dirty="0">
                         <a:solidFill>
@@ -6251,7 +6251,7 @@
                 </a:tc>
                 <a:extLst>
                   <a:ext uri="{0D108BD9-81ED-4DB2-BD59-A6C34878D82A}">
-                    <a16:rowId xmlns="" xmlns:a16="http://schemas.microsoft.com/office/drawing/2014/main" val="10000"/>
+                    <a16:rowId xmlns:a16="http://schemas.microsoft.com/office/drawing/2014/main" xmlns="" val="10000"/>
                   </a:ext>
                 </a:extLst>
               </a:tr>
@@ -6539,7 +6539,7 @@
                 </a:tc>
                 <a:extLst>
                   <a:ext uri="{0D108BD9-81ED-4DB2-BD59-A6C34878D82A}">
-                    <a16:rowId xmlns="" xmlns:a16="http://schemas.microsoft.com/office/drawing/2014/main" val="10001"/>
+                    <a16:rowId xmlns:a16="http://schemas.microsoft.com/office/drawing/2014/main" xmlns="" val="10001"/>
                   </a:ext>
                 </a:extLst>
               </a:tr>
@@ -7093,7 +7093,7 @@
             <p:cNvPr id="103" name="그룹 102">
               <a:extLst>
                 <a:ext uri="{FF2B5EF4-FFF2-40B4-BE49-F238E27FC236}">
-                  <a16:creationId xmlns="" xmlns:a16="http://schemas.microsoft.com/office/drawing/2014/main" id="{F764A971-7E15-4AC0-B56B-D0AEB9381FCD}"/>
+                  <a16:creationId xmlns:a16="http://schemas.microsoft.com/office/drawing/2014/main" xmlns="" id="{F764A971-7E15-4AC0-B56B-D0AEB9381FCD}"/>
                 </a:ext>
               </a:extLst>
             </p:cNvPr>
@@ -7118,7 +7118,7 @@
               <p:cNvPr id="109" name="Freeform 39">
                 <a:extLst>
                   <a:ext uri="{FF2B5EF4-FFF2-40B4-BE49-F238E27FC236}">
-                    <a16:creationId xmlns="" xmlns:a16="http://schemas.microsoft.com/office/drawing/2014/main" id="{C642C60A-EDCD-4418-AF22-CE9228EC1300}"/>
+                    <a16:creationId xmlns:a16="http://schemas.microsoft.com/office/drawing/2014/main" xmlns="" id="{C642C60A-EDCD-4418-AF22-CE9228EC1300}"/>
                   </a:ext>
                 </a:extLst>
               </p:cNvPr>
@@ -8848,7 +8848,7 @@
               <p:cNvPr id="110" name="Freeform 40">
                 <a:extLst>
                   <a:ext uri="{FF2B5EF4-FFF2-40B4-BE49-F238E27FC236}">
-                    <a16:creationId xmlns="" xmlns:a16="http://schemas.microsoft.com/office/drawing/2014/main" id="{31D280BA-97C0-4816-A2C9-713BBD103CC6}"/>
+                    <a16:creationId xmlns:a16="http://schemas.microsoft.com/office/drawing/2014/main" xmlns="" id="{31D280BA-97C0-4816-A2C9-713BBD103CC6}"/>
                   </a:ext>
                 </a:extLst>
               </p:cNvPr>
@@ -9445,7 +9445,7 @@
             <p:cNvPr id="104" name="Freeform 41">
               <a:extLst>
                 <a:ext uri="{FF2B5EF4-FFF2-40B4-BE49-F238E27FC236}">
-                  <a16:creationId xmlns="" xmlns:a16="http://schemas.microsoft.com/office/drawing/2014/main" id="{C24B5697-9EAC-429F-9AE3-9ED30FC4F770}"/>
+                  <a16:creationId xmlns:a16="http://schemas.microsoft.com/office/drawing/2014/main" xmlns="" id="{C24B5697-9EAC-429F-9AE3-9ED30FC4F770}"/>
                 </a:ext>
               </a:extLst>
             </p:cNvPr>
@@ -11374,7 +11374,7 @@
             <p:cNvPr id="106" name="TextBox 105">
               <a:extLst>
                 <a:ext uri="{FF2B5EF4-FFF2-40B4-BE49-F238E27FC236}">
-                  <a16:creationId xmlns="" xmlns:a16="http://schemas.microsoft.com/office/drawing/2014/main" id="{749C370C-59ED-482F-95CC-01B9A670EECB}"/>
+                  <a16:creationId xmlns:a16="http://schemas.microsoft.com/office/drawing/2014/main" xmlns="" id="{749C370C-59ED-482F-95CC-01B9A670EECB}"/>
                 </a:ext>
               </a:extLst>
             </p:cNvPr>
@@ -11417,7 +11417,7 @@
             <p:cNvPr id="107" name="TextBox 106">
               <a:extLst>
                 <a:ext uri="{FF2B5EF4-FFF2-40B4-BE49-F238E27FC236}">
-                  <a16:creationId xmlns="" xmlns:a16="http://schemas.microsoft.com/office/drawing/2014/main" id="{749C370C-59ED-482F-95CC-01B9A670EECB}"/>
+                  <a16:creationId xmlns:a16="http://schemas.microsoft.com/office/drawing/2014/main" xmlns="" id="{749C370C-59ED-482F-95CC-01B9A670EECB}"/>
                 </a:ext>
               </a:extLst>
             </p:cNvPr>
@@ -12048,7 +12048,7 @@
                 <a:gridCol w="1998983">
                   <a:extLst>
                     <a:ext uri="{9D8B030D-6E8A-4147-A177-3AD203B41FA5}">
-                      <a16:colId xmlns="" xmlns:a16="http://schemas.microsoft.com/office/drawing/2014/main" val="20000"/>
+                      <a16:colId xmlns:a16="http://schemas.microsoft.com/office/drawing/2014/main" xmlns="" val="20000"/>
                     </a:ext>
                   </a:extLst>
                 </a:gridCol>
@@ -12123,7 +12123,7 @@
                 </a:tc>
                 <a:extLst>
                   <a:ext uri="{0D108BD9-81ED-4DB2-BD59-A6C34878D82A}">
-                    <a16:rowId xmlns="" xmlns:a16="http://schemas.microsoft.com/office/drawing/2014/main" val="10000"/>
+                    <a16:rowId xmlns:a16="http://schemas.microsoft.com/office/drawing/2014/main" xmlns="" val="10000"/>
                   </a:ext>
                 </a:extLst>
               </a:tr>
@@ -12159,14 +12159,14 @@
                 <a:gridCol w="807555">
                   <a:extLst>
                     <a:ext uri="{9D8B030D-6E8A-4147-A177-3AD203B41FA5}">
-                      <a16:colId xmlns="" xmlns:a16="http://schemas.microsoft.com/office/drawing/2014/main" val="20000"/>
+                      <a16:colId xmlns:a16="http://schemas.microsoft.com/office/drawing/2014/main" xmlns="" val="20000"/>
                     </a:ext>
                   </a:extLst>
                 </a:gridCol>
                 <a:gridCol w="1192044">
                   <a:extLst>
                     <a:ext uri="{9D8B030D-6E8A-4147-A177-3AD203B41FA5}">
-                      <a16:colId xmlns="" xmlns:a16="http://schemas.microsoft.com/office/drawing/2014/main" val="20001"/>
+                      <a16:colId xmlns:a16="http://schemas.microsoft.com/office/drawing/2014/main" xmlns="" val="20001"/>
                     </a:ext>
                   </a:extLst>
                 </a:gridCol>
@@ -12314,7 +12314,7 @@
                 </a:tc>
                 <a:extLst>
                   <a:ext uri="{0D108BD9-81ED-4DB2-BD59-A6C34878D82A}">
-                    <a16:rowId xmlns="" xmlns:a16="http://schemas.microsoft.com/office/drawing/2014/main" val="10001"/>
+                    <a16:rowId xmlns:a16="http://schemas.microsoft.com/office/drawing/2014/main" xmlns="" val="10001"/>
                   </a:ext>
                 </a:extLst>
               </a:tr>
@@ -12730,7 +12730,7 @@
                 <a:gridCol w="1999598">
                   <a:extLst>
                     <a:ext uri="{9D8B030D-6E8A-4147-A177-3AD203B41FA5}">
-                      <a16:colId xmlns="" xmlns:a16="http://schemas.microsoft.com/office/drawing/2014/main" val="20000"/>
+                      <a16:colId xmlns:a16="http://schemas.microsoft.com/office/drawing/2014/main" xmlns="" val="20000"/>
                     </a:ext>
                   </a:extLst>
                 </a:gridCol>
@@ -12805,7 +12805,7 @@
                 </a:tc>
                 <a:extLst>
                   <a:ext uri="{0D108BD9-81ED-4DB2-BD59-A6C34878D82A}">
-                    <a16:rowId xmlns="" xmlns:a16="http://schemas.microsoft.com/office/drawing/2014/main" val="10000"/>
+                    <a16:rowId xmlns:a16="http://schemas.microsoft.com/office/drawing/2014/main" xmlns="" val="10000"/>
                   </a:ext>
                 </a:extLst>
               </a:tr>
@@ -12903,49 +12903,49 @@
                 <a:gridCol w="292263">
                   <a:extLst>
                     <a:ext uri="{9D8B030D-6E8A-4147-A177-3AD203B41FA5}">
-                      <a16:colId xmlns="" xmlns:a16="http://schemas.microsoft.com/office/drawing/2014/main" val="20000"/>
+                      <a16:colId xmlns:a16="http://schemas.microsoft.com/office/drawing/2014/main" xmlns="" val="20000"/>
                     </a:ext>
                   </a:extLst>
                 </a:gridCol>
                 <a:gridCol w="292263">
                   <a:extLst>
                     <a:ext uri="{9D8B030D-6E8A-4147-A177-3AD203B41FA5}">
-                      <a16:colId xmlns="" xmlns:a16="http://schemas.microsoft.com/office/drawing/2014/main" val="20001"/>
+                      <a16:colId xmlns:a16="http://schemas.microsoft.com/office/drawing/2014/main" xmlns="" val="20001"/>
                     </a:ext>
                   </a:extLst>
                 </a:gridCol>
                 <a:gridCol w="292263">
                   <a:extLst>
                     <a:ext uri="{9D8B030D-6E8A-4147-A177-3AD203B41FA5}">
-                      <a16:colId xmlns="" xmlns:a16="http://schemas.microsoft.com/office/drawing/2014/main" val="20002"/>
+                      <a16:colId xmlns:a16="http://schemas.microsoft.com/office/drawing/2014/main" xmlns="" val="20002"/>
                     </a:ext>
                   </a:extLst>
                 </a:gridCol>
                 <a:gridCol w="292263">
                   <a:extLst>
                     <a:ext uri="{9D8B030D-6E8A-4147-A177-3AD203B41FA5}">
-                      <a16:colId xmlns="" xmlns:a16="http://schemas.microsoft.com/office/drawing/2014/main" val="20003"/>
+                      <a16:colId xmlns:a16="http://schemas.microsoft.com/office/drawing/2014/main" xmlns="" val="20003"/>
                     </a:ext>
                   </a:extLst>
                 </a:gridCol>
                 <a:gridCol w="292263">
                   <a:extLst>
                     <a:ext uri="{9D8B030D-6E8A-4147-A177-3AD203B41FA5}">
-                      <a16:colId xmlns="" xmlns:a16="http://schemas.microsoft.com/office/drawing/2014/main" val="20004"/>
+                      <a16:colId xmlns:a16="http://schemas.microsoft.com/office/drawing/2014/main" xmlns="" val="20004"/>
                     </a:ext>
                   </a:extLst>
                 </a:gridCol>
                 <a:gridCol w="292263">
                   <a:extLst>
                     <a:ext uri="{9D8B030D-6E8A-4147-A177-3AD203B41FA5}">
-                      <a16:colId xmlns="" xmlns:a16="http://schemas.microsoft.com/office/drawing/2014/main" val="20005"/>
+                      <a16:colId xmlns:a16="http://schemas.microsoft.com/office/drawing/2014/main" xmlns="" val="20005"/>
                     </a:ext>
                   </a:extLst>
                 </a:gridCol>
                 <a:gridCol w="292263">
                   <a:extLst>
                     <a:ext uri="{9D8B030D-6E8A-4147-A177-3AD203B41FA5}">
-                      <a16:colId xmlns="" xmlns:a16="http://schemas.microsoft.com/office/drawing/2014/main" val="3064443110"/>
+                      <a16:colId xmlns:a16="http://schemas.microsoft.com/office/drawing/2014/main" xmlns="" val="3064443110"/>
                     </a:ext>
                   </a:extLst>
                 </a:gridCol>
@@ -13443,7 +13443,7 @@
                 </a:tc>
                 <a:extLst>
                   <a:ext uri="{0D108BD9-81ED-4DB2-BD59-A6C34878D82A}">
-                    <a16:rowId xmlns="" xmlns:a16="http://schemas.microsoft.com/office/drawing/2014/main" val="10000"/>
+                    <a16:rowId xmlns:a16="http://schemas.microsoft.com/office/drawing/2014/main" xmlns="" val="10000"/>
                   </a:ext>
                 </a:extLst>
               </a:tr>
@@ -13835,7 +13835,7 @@
                 </a:tc>
                 <a:extLst>
                   <a:ext uri="{0D108BD9-81ED-4DB2-BD59-A6C34878D82A}">
-                    <a16:rowId xmlns="" xmlns:a16="http://schemas.microsoft.com/office/drawing/2014/main" val="10001"/>
+                    <a16:rowId xmlns:a16="http://schemas.microsoft.com/office/drawing/2014/main" xmlns="" val="10001"/>
                   </a:ext>
                 </a:extLst>
               </a:tr>
@@ -14725,7 +14725,7 @@
           <p:cNvPr id="116" name="텍스트 개체 틀 2">
             <a:extLst>
               <a:ext uri="{FF2B5EF4-FFF2-40B4-BE49-F238E27FC236}">
-                <a16:creationId xmlns="" xmlns:a16="http://schemas.microsoft.com/office/drawing/2014/main" id="{39356596-B182-4A91-A651-701193D59ADC}"/>
+                <a16:creationId xmlns:a16="http://schemas.microsoft.com/office/drawing/2014/main" xmlns="" id="{39356596-B182-4A91-A651-701193D59ADC}"/>
               </a:ext>
             </a:extLst>
           </p:cNvPr>
@@ -14793,7 +14793,7 @@
           <p:cNvPr id="117" name="표 116">
             <a:extLst>
               <a:ext uri="{FF2B5EF4-FFF2-40B4-BE49-F238E27FC236}">
-                <a16:creationId xmlns="" xmlns:a16="http://schemas.microsoft.com/office/drawing/2014/main" id="{2528AC38-D433-446B-9ECE-D440DD6DD60A}"/>
+                <a16:creationId xmlns:a16="http://schemas.microsoft.com/office/drawing/2014/main" xmlns="" id="{2528AC38-D433-446B-9ECE-D440DD6DD60A}"/>
               </a:ext>
             </a:extLst>
           </p:cNvPr>
@@ -14822,28 +14822,28 @@
                 <a:gridCol w="1097286">
                   <a:extLst>
                     <a:ext uri="{9D8B030D-6E8A-4147-A177-3AD203B41FA5}">
-                      <a16:colId xmlns="" xmlns:a16="http://schemas.microsoft.com/office/drawing/2014/main" val="20000"/>
+                      <a16:colId xmlns:a16="http://schemas.microsoft.com/office/drawing/2014/main" xmlns="" val="20000"/>
                     </a:ext>
                   </a:extLst>
                 </a:gridCol>
                 <a:gridCol w="1097286">
                   <a:extLst>
                     <a:ext uri="{9D8B030D-6E8A-4147-A177-3AD203B41FA5}">
-                      <a16:colId xmlns="" xmlns:a16="http://schemas.microsoft.com/office/drawing/2014/main" val="2960935981"/>
+                      <a16:colId xmlns:a16="http://schemas.microsoft.com/office/drawing/2014/main" xmlns="" val="2960935981"/>
                     </a:ext>
                   </a:extLst>
                 </a:gridCol>
                 <a:gridCol w="1097286">
                   <a:extLst>
                     <a:ext uri="{9D8B030D-6E8A-4147-A177-3AD203B41FA5}">
-                      <a16:colId xmlns="" xmlns:a16="http://schemas.microsoft.com/office/drawing/2014/main" val="20001"/>
+                      <a16:colId xmlns:a16="http://schemas.microsoft.com/office/drawing/2014/main" xmlns="" val="20001"/>
                     </a:ext>
                   </a:extLst>
                 </a:gridCol>
                 <a:gridCol w="1097286">
                   <a:extLst>
                     <a:ext uri="{9D8B030D-6E8A-4147-A177-3AD203B41FA5}">
-                      <a16:colId xmlns="" xmlns:a16="http://schemas.microsoft.com/office/drawing/2014/main" val="20002"/>
+                      <a16:colId xmlns:a16="http://schemas.microsoft.com/office/drawing/2014/main" xmlns="" val="20002"/>
                     </a:ext>
                   </a:extLst>
                 </a:gridCol>
@@ -15131,7 +15131,7 @@
                 </a:tc>
                 <a:extLst>
                   <a:ext uri="{0D108BD9-81ED-4DB2-BD59-A6C34878D82A}">
-                    <a16:rowId xmlns="" xmlns:a16="http://schemas.microsoft.com/office/drawing/2014/main" val="10000"/>
+                    <a16:rowId xmlns:a16="http://schemas.microsoft.com/office/drawing/2014/main" xmlns="" val="10000"/>
                   </a:ext>
                 </a:extLst>
               </a:tr>
@@ -15356,7 +15356,7 @@
                 </a:tc>
                 <a:extLst>
                   <a:ext uri="{0D108BD9-81ED-4DB2-BD59-A6C34878D82A}">
-                    <a16:rowId xmlns="" xmlns:a16="http://schemas.microsoft.com/office/drawing/2014/main" val="10001"/>
+                    <a16:rowId xmlns:a16="http://schemas.microsoft.com/office/drawing/2014/main" xmlns="" val="10001"/>
                   </a:ext>
                 </a:extLst>
               </a:tr>
@@ -15809,7 +15809,7 @@
           <p:cNvPr id="118" name="텍스트 개체 틀 2">
             <a:extLst>
               <a:ext uri="{FF2B5EF4-FFF2-40B4-BE49-F238E27FC236}">
-                <a16:creationId xmlns="" xmlns:a16="http://schemas.microsoft.com/office/drawing/2014/main" id="{BEE0A621-CF2E-4DFD-AF9C-331BFBF31C37}"/>
+                <a16:creationId xmlns:a16="http://schemas.microsoft.com/office/drawing/2014/main" xmlns="" id="{BEE0A621-CF2E-4DFD-AF9C-331BFBF31C37}"/>
               </a:ext>
             </a:extLst>
           </p:cNvPr>
@@ -15877,7 +15877,7 @@
           <p:cNvPr id="119" name="텍스트 개체 틀 2">
             <a:extLst>
               <a:ext uri="{FF2B5EF4-FFF2-40B4-BE49-F238E27FC236}">
-                <a16:creationId xmlns="" xmlns:a16="http://schemas.microsoft.com/office/drawing/2014/main" id="{CCF3F163-C6DD-4D14-81EA-84C4A229296B}"/>
+                <a16:creationId xmlns:a16="http://schemas.microsoft.com/office/drawing/2014/main" xmlns="" id="{CCF3F163-C6DD-4D14-81EA-84C4A229296B}"/>
               </a:ext>
             </a:extLst>
           </p:cNvPr>
@@ -15945,7 +15945,7 @@
           <p:cNvPr id="120" name="텍스트 개체 틀 2">
             <a:extLst>
               <a:ext uri="{FF2B5EF4-FFF2-40B4-BE49-F238E27FC236}">
-                <a16:creationId xmlns="" xmlns:a16="http://schemas.microsoft.com/office/drawing/2014/main" id="{63137AD7-36A2-4F43-B02C-18BB555AA6C6}"/>
+                <a16:creationId xmlns:a16="http://schemas.microsoft.com/office/drawing/2014/main" xmlns="" id="{63137AD7-36A2-4F43-B02C-18BB555AA6C6}"/>
               </a:ext>
             </a:extLst>
           </p:cNvPr>
@@ -16013,7 +16013,7 @@
           <p:cNvPr id="121" name="텍스트 개체 틀 2">
             <a:extLst>
               <a:ext uri="{FF2B5EF4-FFF2-40B4-BE49-F238E27FC236}">
-                <a16:creationId xmlns="" xmlns:a16="http://schemas.microsoft.com/office/drawing/2014/main" id="{BF6739D5-8903-46CE-9F68-36C4FB798FCE}"/>
+                <a16:creationId xmlns:a16="http://schemas.microsoft.com/office/drawing/2014/main" xmlns="" id="{BF6739D5-8903-46CE-9F68-36C4FB798FCE}"/>
               </a:ext>
             </a:extLst>
           </p:cNvPr>
@@ -16081,7 +16081,7 @@
           <p:cNvPr id="122" name="텍스트 개체 틀 2">
             <a:extLst>
               <a:ext uri="{FF2B5EF4-FFF2-40B4-BE49-F238E27FC236}">
-                <a16:creationId xmlns="" xmlns:a16="http://schemas.microsoft.com/office/drawing/2014/main" id="{F82419C1-B86B-454F-9660-9AFB504B7C49}"/>
+                <a16:creationId xmlns:a16="http://schemas.microsoft.com/office/drawing/2014/main" xmlns="" id="{F82419C1-B86B-454F-9660-9AFB504B7C49}"/>
               </a:ext>
             </a:extLst>
           </p:cNvPr>
@@ -16149,7 +16149,7 @@
           <p:cNvPr id="123" name="텍스트 개체 틀 2">
             <a:extLst>
               <a:ext uri="{FF2B5EF4-FFF2-40B4-BE49-F238E27FC236}">
-                <a16:creationId xmlns="" xmlns:a16="http://schemas.microsoft.com/office/drawing/2014/main" id="{40B4DE51-D337-491E-9F95-2948613711D2}"/>
+                <a16:creationId xmlns:a16="http://schemas.microsoft.com/office/drawing/2014/main" xmlns="" id="{40B4DE51-D337-491E-9F95-2948613711D2}"/>
               </a:ext>
             </a:extLst>
           </p:cNvPr>
@@ -16217,7 +16217,7 @@
           <p:cNvPr id="124" name="텍스트 개체 틀 2">
             <a:extLst>
               <a:ext uri="{FF2B5EF4-FFF2-40B4-BE49-F238E27FC236}">
-                <a16:creationId xmlns="" xmlns:a16="http://schemas.microsoft.com/office/drawing/2014/main" id="{41C28B4A-70A1-496D-ABEA-73803A110D10}"/>
+                <a16:creationId xmlns:a16="http://schemas.microsoft.com/office/drawing/2014/main" xmlns="" id="{41C28B4A-70A1-496D-ABEA-73803A110D10}"/>
               </a:ext>
             </a:extLst>
           </p:cNvPr>
@@ -16285,7 +16285,7 @@
           <p:cNvPr id="125" name="텍스트 개체 틀 2">
             <a:extLst>
               <a:ext uri="{FF2B5EF4-FFF2-40B4-BE49-F238E27FC236}">
-                <a16:creationId xmlns="" xmlns:a16="http://schemas.microsoft.com/office/drawing/2014/main" id="{6AD8BD0A-5D58-460E-8BF5-50E93FDC18E4}"/>
+                <a16:creationId xmlns:a16="http://schemas.microsoft.com/office/drawing/2014/main" xmlns="" id="{6AD8BD0A-5D58-460E-8BF5-50E93FDC18E4}"/>
               </a:ext>
             </a:extLst>
           </p:cNvPr>
@@ -16353,7 +16353,7 @@
           <p:cNvPr id="134" name="텍스트 개체 틀 2">
             <a:extLst>
               <a:ext uri="{FF2B5EF4-FFF2-40B4-BE49-F238E27FC236}">
-                <a16:creationId xmlns="" xmlns:a16="http://schemas.microsoft.com/office/drawing/2014/main" id="{38527D15-F4A4-463D-8D4E-D09F906CCE0A}"/>
+                <a16:creationId xmlns:a16="http://schemas.microsoft.com/office/drawing/2014/main" xmlns="" id="{38527D15-F4A4-463D-8D4E-D09F906CCE0A}"/>
               </a:ext>
             </a:extLst>
           </p:cNvPr>
@@ -16421,7 +16421,7 @@
           <p:cNvPr id="140" name="텍스트 개체 틀 2">
             <a:extLst>
               <a:ext uri="{FF2B5EF4-FFF2-40B4-BE49-F238E27FC236}">
-                <a16:creationId xmlns="" xmlns:a16="http://schemas.microsoft.com/office/drawing/2014/main" id="{5C7B6C29-E283-436D-AFEA-80C207DB615F}"/>
+                <a16:creationId xmlns:a16="http://schemas.microsoft.com/office/drawing/2014/main" xmlns="" id="{5C7B6C29-E283-436D-AFEA-80C207DB615F}"/>
               </a:ext>
             </a:extLst>
           </p:cNvPr>
@@ -16489,7 +16489,7 @@
           <p:cNvPr id="206" name="TextBox 205">
             <a:extLst>
               <a:ext uri="{FF2B5EF4-FFF2-40B4-BE49-F238E27FC236}">
-                <a16:creationId xmlns="" xmlns:a16="http://schemas.microsoft.com/office/drawing/2014/main" id="{A6A5BCC0-E4CB-4597-96C3-C861C547865C}"/>
+                <a16:creationId xmlns:a16="http://schemas.microsoft.com/office/drawing/2014/main" xmlns="" id="{A6A5BCC0-E4CB-4597-96C3-C861C547865C}"/>
               </a:ext>
             </a:extLst>
           </p:cNvPr>
@@ -16531,7 +16531,7 @@
           <p:cNvPr id="208" name="TextBox 207">
             <a:extLst>
               <a:ext uri="{FF2B5EF4-FFF2-40B4-BE49-F238E27FC236}">
-                <a16:creationId xmlns="" xmlns:a16="http://schemas.microsoft.com/office/drawing/2014/main" id="{D8FA3B77-5413-4183-89C1-C9B92C4210ED}"/>
+                <a16:creationId xmlns:a16="http://schemas.microsoft.com/office/drawing/2014/main" xmlns="" id="{D8FA3B77-5413-4183-89C1-C9B92C4210ED}"/>
               </a:ext>
             </a:extLst>
           </p:cNvPr>
@@ -16573,7 +16573,7 @@
           <p:cNvPr id="210" name="TextBox 209">
             <a:extLst>
               <a:ext uri="{FF2B5EF4-FFF2-40B4-BE49-F238E27FC236}">
-                <a16:creationId xmlns="" xmlns:a16="http://schemas.microsoft.com/office/drawing/2014/main" id="{56ABD502-0C36-4EFF-A923-8A6AA5565C47}"/>
+                <a16:creationId xmlns:a16="http://schemas.microsoft.com/office/drawing/2014/main" xmlns="" id="{56ABD502-0C36-4EFF-A923-8A6AA5565C47}"/>
               </a:ext>
             </a:extLst>
           </p:cNvPr>
@@ -16615,7 +16615,7 @@
           <p:cNvPr id="212" name="TextBox 211">
             <a:extLst>
               <a:ext uri="{FF2B5EF4-FFF2-40B4-BE49-F238E27FC236}">
-                <a16:creationId xmlns="" xmlns:a16="http://schemas.microsoft.com/office/drawing/2014/main" id="{FD3C6A2B-C055-431F-9A46-8C321EF4FD56}"/>
+                <a16:creationId xmlns:a16="http://schemas.microsoft.com/office/drawing/2014/main" xmlns="" id="{FD3C6A2B-C055-431F-9A46-8C321EF4FD56}"/>
               </a:ext>
             </a:extLst>
           </p:cNvPr>
@@ -16660,7 +16660,7 @@
           <p:cNvPr id="9" name="직사각형 8">
             <a:extLst>
               <a:ext uri="{FF2B5EF4-FFF2-40B4-BE49-F238E27FC236}">
-                <a16:creationId xmlns="" xmlns:a16="http://schemas.microsoft.com/office/drawing/2014/main" id="{A200AC85-3E95-4C11-8B9D-285B78F0FDB2}"/>
+                <a16:creationId xmlns:a16="http://schemas.microsoft.com/office/drawing/2014/main" xmlns="" id="{A200AC85-3E95-4C11-8B9D-285B78F0FDB2}"/>
               </a:ext>
             </a:extLst>
           </p:cNvPr>
@@ -16714,7 +16714,7 @@
           <p:cNvPr id="221" name="직사각형 220">
             <a:extLst>
               <a:ext uri="{FF2B5EF4-FFF2-40B4-BE49-F238E27FC236}">
-                <a16:creationId xmlns="" xmlns:a16="http://schemas.microsoft.com/office/drawing/2014/main" id="{CD8FD382-C129-4EBE-8704-70A6A42909A9}"/>
+                <a16:creationId xmlns:a16="http://schemas.microsoft.com/office/drawing/2014/main" xmlns="" id="{CD8FD382-C129-4EBE-8704-70A6A42909A9}"/>
               </a:ext>
             </a:extLst>
           </p:cNvPr>
@@ -16768,7 +16768,7 @@
           <p:cNvPr id="222" name="직사각형 221">
             <a:extLst>
               <a:ext uri="{FF2B5EF4-FFF2-40B4-BE49-F238E27FC236}">
-                <a16:creationId xmlns="" xmlns:a16="http://schemas.microsoft.com/office/drawing/2014/main" id="{C274FD8D-FF01-4228-A9D4-8419ED2A6F23}"/>
+                <a16:creationId xmlns:a16="http://schemas.microsoft.com/office/drawing/2014/main" xmlns="" id="{C274FD8D-FF01-4228-A9D4-8419ED2A6F23}"/>
               </a:ext>
             </a:extLst>
           </p:cNvPr>
@@ -16822,7 +16822,7 @@
           <p:cNvPr id="223" name="직사각형 222">
             <a:extLst>
               <a:ext uri="{FF2B5EF4-FFF2-40B4-BE49-F238E27FC236}">
-                <a16:creationId xmlns="" xmlns:a16="http://schemas.microsoft.com/office/drawing/2014/main" id="{A2A4BE82-4EE5-49CF-8A3A-9CC94E056583}"/>
+                <a16:creationId xmlns:a16="http://schemas.microsoft.com/office/drawing/2014/main" xmlns="" id="{A2A4BE82-4EE5-49CF-8A3A-9CC94E056583}"/>
               </a:ext>
             </a:extLst>
           </p:cNvPr>
@@ -16876,7 +16876,7 @@
           <p:cNvPr id="244" name="직사각형 243">
             <a:extLst>
               <a:ext uri="{FF2B5EF4-FFF2-40B4-BE49-F238E27FC236}">
-                <a16:creationId xmlns="" xmlns:a16="http://schemas.microsoft.com/office/drawing/2014/main" id="{238D2C57-D184-4A22-93E7-21730AD56375}"/>
+                <a16:creationId xmlns:a16="http://schemas.microsoft.com/office/drawing/2014/main" xmlns="" id="{238D2C57-D184-4A22-93E7-21730AD56375}"/>
               </a:ext>
             </a:extLst>
           </p:cNvPr>
@@ -17001,7 +17001,7 @@
           <p:cNvPr id="88" name="텍스트 개체 틀 2">
             <a:extLst>
               <a:ext uri="{FF2B5EF4-FFF2-40B4-BE49-F238E27FC236}">
-                <a16:creationId xmlns="" xmlns:a16="http://schemas.microsoft.com/office/drawing/2014/main" id="{BEE0A621-CF2E-4DFD-AF9C-331BFBF31C37}"/>
+                <a16:creationId xmlns:a16="http://schemas.microsoft.com/office/drawing/2014/main" xmlns="" id="{BEE0A621-CF2E-4DFD-AF9C-331BFBF31C37}"/>
               </a:ext>
             </a:extLst>
           </p:cNvPr>
@@ -17069,7 +17069,7 @@
           <p:cNvPr id="89" name="텍스트 개체 틀 2">
             <a:extLst>
               <a:ext uri="{FF2B5EF4-FFF2-40B4-BE49-F238E27FC236}">
-                <a16:creationId xmlns="" xmlns:a16="http://schemas.microsoft.com/office/drawing/2014/main" id="{BEE0A621-CF2E-4DFD-AF9C-331BFBF31C37}"/>
+                <a16:creationId xmlns:a16="http://schemas.microsoft.com/office/drawing/2014/main" xmlns="" id="{BEE0A621-CF2E-4DFD-AF9C-331BFBF31C37}"/>
               </a:ext>
             </a:extLst>
           </p:cNvPr>
@@ -17137,7 +17137,7 @@
           <p:cNvPr id="90" name="텍스트 개체 틀 2">
             <a:extLst>
               <a:ext uri="{FF2B5EF4-FFF2-40B4-BE49-F238E27FC236}">
-                <a16:creationId xmlns="" xmlns:a16="http://schemas.microsoft.com/office/drawing/2014/main" id="{BEE0A621-CF2E-4DFD-AF9C-331BFBF31C37}"/>
+                <a16:creationId xmlns:a16="http://schemas.microsoft.com/office/drawing/2014/main" xmlns="" id="{BEE0A621-CF2E-4DFD-AF9C-331BFBF31C37}"/>
               </a:ext>
             </a:extLst>
           </p:cNvPr>
@@ -17205,7 +17205,7 @@
           <p:cNvPr id="91" name="텍스트 개체 틀 2">
             <a:extLst>
               <a:ext uri="{FF2B5EF4-FFF2-40B4-BE49-F238E27FC236}">
-                <a16:creationId xmlns="" xmlns:a16="http://schemas.microsoft.com/office/drawing/2014/main" id="{BEE0A621-CF2E-4DFD-AF9C-331BFBF31C37}"/>
+                <a16:creationId xmlns:a16="http://schemas.microsoft.com/office/drawing/2014/main" xmlns="" id="{BEE0A621-CF2E-4DFD-AF9C-331BFBF31C37}"/>
               </a:ext>
             </a:extLst>
           </p:cNvPr>
@@ -17273,7 +17273,7 @@
           <p:cNvPr id="92" name="텍스트 개체 틀 2">
             <a:extLst>
               <a:ext uri="{FF2B5EF4-FFF2-40B4-BE49-F238E27FC236}">
-                <a16:creationId xmlns="" xmlns:a16="http://schemas.microsoft.com/office/drawing/2014/main" id="{BEE0A621-CF2E-4DFD-AF9C-331BFBF31C37}"/>
+                <a16:creationId xmlns:a16="http://schemas.microsoft.com/office/drawing/2014/main" xmlns="" id="{BEE0A621-CF2E-4DFD-AF9C-331BFBF31C37}"/>
               </a:ext>
             </a:extLst>
           </p:cNvPr>
@@ -17341,7 +17341,7 @@
           <p:cNvPr id="93" name="텍스트 개체 틀 2">
             <a:extLst>
               <a:ext uri="{FF2B5EF4-FFF2-40B4-BE49-F238E27FC236}">
-                <a16:creationId xmlns="" xmlns:a16="http://schemas.microsoft.com/office/drawing/2014/main" id="{BEE0A621-CF2E-4DFD-AF9C-331BFBF31C37}"/>
+                <a16:creationId xmlns:a16="http://schemas.microsoft.com/office/drawing/2014/main" xmlns="" id="{BEE0A621-CF2E-4DFD-AF9C-331BFBF31C37}"/>
               </a:ext>
             </a:extLst>
           </p:cNvPr>
@@ -17409,7 +17409,7 @@
           <p:cNvPr id="94" name="텍스트 개체 틀 2">
             <a:extLst>
               <a:ext uri="{FF2B5EF4-FFF2-40B4-BE49-F238E27FC236}">
-                <a16:creationId xmlns="" xmlns:a16="http://schemas.microsoft.com/office/drawing/2014/main" id="{BEE0A621-CF2E-4DFD-AF9C-331BFBF31C37}"/>
+                <a16:creationId xmlns:a16="http://schemas.microsoft.com/office/drawing/2014/main" xmlns="" id="{BEE0A621-CF2E-4DFD-AF9C-331BFBF31C37}"/>
               </a:ext>
             </a:extLst>
           </p:cNvPr>
@@ -17477,7 +17477,7 @@
           <p:cNvPr id="95" name="텍스트 개체 틀 2">
             <a:extLst>
               <a:ext uri="{FF2B5EF4-FFF2-40B4-BE49-F238E27FC236}">
-                <a16:creationId xmlns="" xmlns:a16="http://schemas.microsoft.com/office/drawing/2014/main" id="{BEE0A621-CF2E-4DFD-AF9C-331BFBF31C37}"/>
+                <a16:creationId xmlns:a16="http://schemas.microsoft.com/office/drawing/2014/main" xmlns="" id="{BEE0A621-CF2E-4DFD-AF9C-331BFBF31C37}"/>
               </a:ext>
             </a:extLst>
           </p:cNvPr>
@@ -17667,28 +17667,28 @@
                 <a:gridCol w="1095795">
                   <a:extLst>
                     <a:ext uri="{9D8B030D-6E8A-4147-A177-3AD203B41FA5}">
-                      <a16:colId xmlns="" xmlns:a16="http://schemas.microsoft.com/office/drawing/2014/main" val="20000"/>
+                      <a16:colId xmlns:a16="http://schemas.microsoft.com/office/drawing/2014/main" xmlns="" val="20000"/>
                     </a:ext>
                   </a:extLst>
                 </a:gridCol>
                 <a:gridCol w="1088527">
                   <a:extLst>
                     <a:ext uri="{9D8B030D-6E8A-4147-A177-3AD203B41FA5}">
-                      <a16:colId xmlns="" xmlns:a16="http://schemas.microsoft.com/office/drawing/2014/main" val="20001"/>
+                      <a16:colId xmlns:a16="http://schemas.microsoft.com/office/drawing/2014/main" xmlns="" val="20001"/>
                     </a:ext>
                   </a:extLst>
                 </a:gridCol>
                 <a:gridCol w="3464423">
                   <a:extLst>
                     <a:ext uri="{9D8B030D-6E8A-4147-A177-3AD203B41FA5}">
-                      <a16:colId xmlns="" xmlns:a16="http://schemas.microsoft.com/office/drawing/2014/main" val="20002"/>
+                      <a16:colId xmlns:a16="http://schemas.microsoft.com/office/drawing/2014/main" xmlns="" val="20002"/>
                     </a:ext>
                   </a:extLst>
                 </a:gridCol>
                 <a:gridCol w="3419474">
                   <a:extLst>
                     <a:ext uri="{9D8B030D-6E8A-4147-A177-3AD203B41FA5}">
-                      <a16:colId xmlns="" xmlns:a16="http://schemas.microsoft.com/office/drawing/2014/main" val="20003"/>
+                      <a16:colId xmlns:a16="http://schemas.microsoft.com/office/drawing/2014/main" xmlns="" val="20003"/>
                     </a:ext>
                   </a:extLst>
                 </a:gridCol>
@@ -17948,7 +17948,7 @@
                 </a:tc>
                 <a:extLst>
                   <a:ext uri="{0D108BD9-81ED-4DB2-BD59-A6C34878D82A}">
-                    <a16:rowId xmlns="" xmlns:a16="http://schemas.microsoft.com/office/drawing/2014/main" val="10000"/>
+                    <a16:rowId xmlns:a16="http://schemas.microsoft.com/office/drawing/2014/main" xmlns="" val="10000"/>
                   </a:ext>
                 </a:extLst>
               </a:tr>
@@ -18207,7 +18207,7 @@
                 </a:tc>
                 <a:extLst>
                   <a:ext uri="{0D108BD9-81ED-4DB2-BD59-A6C34878D82A}">
-                    <a16:rowId xmlns="" xmlns:a16="http://schemas.microsoft.com/office/drawing/2014/main" val="10001"/>
+                    <a16:rowId xmlns:a16="http://schemas.microsoft.com/office/drawing/2014/main" xmlns="" val="10001"/>
                   </a:ext>
                 </a:extLst>
               </a:tr>
@@ -18434,7 +18434,7 @@
                 </a:tc>
                 <a:extLst>
                   <a:ext uri="{0D108BD9-81ED-4DB2-BD59-A6C34878D82A}">
-                    <a16:rowId xmlns="" xmlns:a16="http://schemas.microsoft.com/office/drawing/2014/main" val="10002"/>
+                    <a16:rowId xmlns:a16="http://schemas.microsoft.com/office/drawing/2014/main" xmlns="" val="10002"/>
                   </a:ext>
                 </a:extLst>
               </a:tr>
@@ -18693,7 +18693,7 @@
                 </a:tc>
                 <a:extLst>
                   <a:ext uri="{0D108BD9-81ED-4DB2-BD59-A6C34878D82A}">
-                    <a16:rowId xmlns="" xmlns:a16="http://schemas.microsoft.com/office/drawing/2014/main" val="10003"/>
+                    <a16:rowId xmlns:a16="http://schemas.microsoft.com/office/drawing/2014/main" xmlns="" val="10003"/>
                   </a:ext>
                 </a:extLst>
               </a:tr>
@@ -18936,7 +18936,7 @@
                 </a:tc>
                 <a:extLst>
                   <a:ext uri="{0D108BD9-81ED-4DB2-BD59-A6C34878D82A}">
-                    <a16:rowId xmlns="" xmlns:a16="http://schemas.microsoft.com/office/drawing/2014/main" val="10004"/>
+                    <a16:rowId xmlns:a16="http://schemas.microsoft.com/office/drawing/2014/main" xmlns="" val="10004"/>
                   </a:ext>
                 </a:extLst>
               </a:tr>
@@ -19195,7 +19195,7 @@
                 </a:tc>
                 <a:extLst>
                   <a:ext uri="{0D108BD9-81ED-4DB2-BD59-A6C34878D82A}">
-                    <a16:rowId xmlns="" xmlns:a16="http://schemas.microsoft.com/office/drawing/2014/main" val="10005"/>
+                    <a16:rowId xmlns:a16="http://schemas.microsoft.com/office/drawing/2014/main" xmlns="" val="10005"/>
                   </a:ext>
                 </a:extLst>
               </a:tr>
@@ -25777,21 +25777,21 @@
                 <a:gridCol w="634245">
                   <a:extLst>
                     <a:ext uri="{9D8B030D-6E8A-4147-A177-3AD203B41FA5}">
-                      <a16:colId xmlns="" xmlns:a16="http://schemas.microsoft.com/office/drawing/2014/main" val="20000"/>
+                      <a16:colId xmlns:a16="http://schemas.microsoft.com/office/drawing/2014/main" xmlns="" val="20000"/>
                     </a:ext>
                   </a:extLst>
                 </a:gridCol>
                 <a:gridCol w="3664323">
                   <a:extLst>
                     <a:ext uri="{9D8B030D-6E8A-4147-A177-3AD203B41FA5}">
-                      <a16:colId xmlns="" xmlns:a16="http://schemas.microsoft.com/office/drawing/2014/main" val="20001"/>
+                      <a16:colId xmlns:a16="http://schemas.microsoft.com/office/drawing/2014/main" xmlns="" val="20001"/>
                     </a:ext>
                   </a:extLst>
                 </a:gridCol>
                 <a:gridCol w="3664323">
                   <a:extLst>
                     <a:ext uri="{9D8B030D-6E8A-4147-A177-3AD203B41FA5}">
-                      <a16:colId xmlns="" xmlns:a16="http://schemas.microsoft.com/office/drawing/2014/main" val="20002"/>
+                      <a16:colId xmlns:a16="http://schemas.microsoft.com/office/drawing/2014/main" xmlns="" val="20002"/>
                     </a:ext>
                   </a:extLst>
                 </a:gridCol>
@@ -26067,7 +26067,7 @@
                 </a:tc>
                 <a:extLst>
                   <a:ext uri="{0D108BD9-81ED-4DB2-BD59-A6C34878D82A}">
-                    <a16:rowId xmlns="" xmlns:a16="http://schemas.microsoft.com/office/drawing/2014/main" val="10000"/>
+                    <a16:rowId xmlns:a16="http://schemas.microsoft.com/office/drawing/2014/main" xmlns="" val="10000"/>
                   </a:ext>
                 </a:extLst>
               </a:tr>
@@ -26355,7 +26355,7 @@
                 </a:tc>
                 <a:extLst>
                   <a:ext uri="{0D108BD9-81ED-4DB2-BD59-A6C34878D82A}">
-                    <a16:rowId xmlns="" xmlns:a16="http://schemas.microsoft.com/office/drawing/2014/main" val="10001"/>
+                    <a16:rowId xmlns:a16="http://schemas.microsoft.com/office/drawing/2014/main" xmlns="" val="10001"/>
                   </a:ext>
                 </a:extLst>
               </a:tr>
@@ -26623,7 +26623,7 @@
                 </a:tc>
                 <a:extLst>
                   <a:ext uri="{0D108BD9-81ED-4DB2-BD59-A6C34878D82A}">
-                    <a16:rowId xmlns="" xmlns:a16="http://schemas.microsoft.com/office/drawing/2014/main" val="10002"/>
+                    <a16:rowId xmlns:a16="http://schemas.microsoft.com/office/drawing/2014/main" xmlns="" val="10002"/>
                   </a:ext>
                 </a:extLst>
               </a:tr>
@@ -27276,7 +27276,7 @@
                 </a:tc>
                 <a:extLst>
                   <a:ext uri="{0D108BD9-81ED-4DB2-BD59-A6C34878D82A}">
-                    <a16:rowId xmlns="" xmlns:a16="http://schemas.microsoft.com/office/drawing/2014/main" val="10003"/>
+                    <a16:rowId xmlns:a16="http://schemas.microsoft.com/office/drawing/2014/main" xmlns="" val="10003"/>
                   </a:ext>
                 </a:extLst>
               </a:tr>
@@ -29170,28 +29170,28 @@
                 <a:gridCol w="652202">
                   <a:extLst>
                     <a:ext uri="{9D8B030D-6E8A-4147-A177-3AD203B41FA5}">
-                      <a16:colId xmlns="" xmlns:a16="http://schemas.microsoft.com/office/drawing/2014/main" val="20000"/>
+                      <a16:colId xmlns:a16="http://schemas.microsoft.com/office/drawing/2014/main" xmlns="" val="20000"/>
                     </a:ext>
                   </a:extLst>
                 </a:gridCol>
                 <a:gridCol w="2462462">
                   <a:extLst>
                     <a:ext uri="{9D8B030D-6E8A-4147-A177-3AD203B41FA5}">
-                      <a16:colId xmlns="" xmlns:a16="http://schemas.microsoft.com/office/drawing/2014/main" val="20001"/>
+                      <a16:colId xmlns:a16="http://schemas.microsoft.com/office/drawing/2014/main" xmlns="" val="20001"/>
                     </a:ext>
                   </a:extLst>
                 </a:gridCol>
                 <a:gridCol w="2462462">
                   <a:extLst>
                     <a:ext uri="{9D8B030D-6E8A-4147-A177-3AD203B41FA5}">
-                      <a16:colId xmlns="" xmlns:a16="http://schemas.microsoft.com/office/drawing/2014/main" val="20002"/>
+                      <a16:colId xmlns:a16="http://schemas.microsoft.com/office/drawing/2014/main" xmlns="" val="20002"/>
                     </a:ext>
                   </a:extLst>
                 </a:gridCol>
                 <a:gridCol w="2462462">
                   <a:extLst>
                     <a:ext uri="{9D8B030D-6E8A-4147-A177-3AD203B41FA5}">
-                      <a16:colId xmlns="" xmlns:a16="http://schemas.microsoft.com/office/drawing/2014/main" val="20003"/>
+                      <a16:colId xmlns:a16="http://schemas.microsoft.com/office/drawing/2014/main" xmlns="" val="20003"/>
                     </a:ext>
                   </a:extLst>
                 </a:gridCol>
@@ -29491,7 +29491,7 @@
                 </a:tc>
                 <a:extLst>
                   <a:ext uri="{0D108BD9-81ED-4DB2-BD59-A6C34878D82A}">
-                    <a16:rowId xmlns="" xmlns:a16="http://schemas.microsoft.com/office/drawing/2014/main" val="10000"/>
+                    <a16:rowId xmlns:a16="http://schemas.microsoft.com/office/drawing/2014/main" xmlns="" val="10000"/>
                   </a:ext>
                 </a:extLst>
               </a:tr>
@@ -29808,7 +29808,7 @@
                 </a:tc>
                 <a:extLst>
                   <a:ext uri="{0D108BD9-81ED-4DB2-BD59-A6C34878D82A}">
-                    <a16:rowId xmlns="" xmlns:a16="http://schemas.microsoft.com/office/drawing/2014/main" val="10001"/>
+                    <a16:rowId xmlns:a16="http://schemas.microsoft.com/office/drawing/2014/main" xmlns="" val="10001"/>
                   </a:ext>
                 </a:extLst>
               </a:tr>
@@ -30538,7 +30538,7 @@
                 </a:tc>
                 <a:extLst>
                   <a:ext uri="{0D108BD9-81ED-4DB2-BD59-A6C34878D82A}">
-                    <a16:rowId xmlns="" xmlns:a16="http://schemas.microsoft.com/office/drawing/2014/main" val="10002"/>
+                    <a16:rowId xmlns:a16="http://schemas.microsoft.com/office/drawing/2014/main" xmlns="" val="10002"/>
                   </a:ext>
                 </a:extLst>
               </a:tr>

</xml_diff>